<commit_message>
updated ppt for fig 1
</commit_message>
<xml_diff>
--- a/Fungi/Fig1.pptx
+++ b/Fungi/Fig1.pptx
@@ -197,7 +197,7 @@
           <a:p>
             <a:fld id="{E1E67E7B-035A-4F4E-A435-C359FA3B27EE}" type="datetimeFigureOut">
               <a:rPr lang="en-US" smtClean="0"/>
-              <a:t>11/29/18</a:t>
+              <a:t>12/3/18</a:t>
             </a:fld>
             <a:endParaRPr lang="en-US"/>
           </a:p>
@@ -677,7 +677,7 @@
           <a:p>
             <a:fld id="{283E34CF-7AD3-0941-A50D-6D559A1CA0CC}" type="datetimeFigureOut">
               <a:rPr lang="en-US" smtClean="0"/>
-              <a:t>11/29/18</a:t>
+              <a:t>12/3/18</a:t>
             </a:fld>
             <a:endParaRPr lang="en-US"/>
           </a:p>
@@ -845,7 +845,7 @@
           <a:p>
             <a:fld id="{283E34CF-7AD3-0941-A50D-6D559A1CA0CC}" type="datetimeFigureOut">
               <a:rPr lang="en-US" smtClean="0"/>
-              <a:t>11/29/18</a:t>
+              <a:t>12/3/18</a:t>
             </a:fld>
             <a:endParaRPr lang="en-US"/>
           </a:p>
@@ -1023,7 +1023,7 @@
           <a:p>
             <a:fld id="{283E34CF-7AD3-0941-A50D-6D559A1CA0CC}" type="datetimeFigureOut">
               <a:rPr lang="en-US" smtClean="0"/>
-              <a:t>11/29/18</a:t>
+              <a:t>12/3/18</a:t>
             </a:fld>
             <a:endParaRPr lang="en-US"/>
           </a:p>
@@ -1191,7 +1191,7 @@
           <a:p>
             <a:fld id="{283E34CF-7AD3-0941-A50D-6D559A1CA0CC}" type="datetimeFigureOut">
               <a:rPr lang="en-US" smtClean="0"/>
-              <a:t>11/29/18</a:t>
+              <a:t>12/3/18</a:t>
             </a:fld>
             <a:endParaRPr lang="en-US"/>
           </a:p>
@@ -1436,7 +1436,7 @@
           <a:p>
             <a:fld id="{283E34CF-7AD3-0941-A50D-6D559A1CA0CC}" type="datetimeFigureOut">
               <a:rPr lang="en-US" smtClean="0"/>
-              <a:t>11/29/18</a:t>
+              <a:t>12/3/18</a:t>
             </a:fld>
             <a:endParaRPr lang="en-US"/>
           </a:p>
@@ -1665,7 +1665,7 @@
           <a:p>
             <a:fld id="{283E34CF-7AD3-0941-A50D-6D559A1CA0CC}" type="datetimeFigureOut">
               <a:rPr lang="en-US" smtClean="0"/>
-              <a:t>11/29/18</a:t>
+              <a:t>12/3/18</a:t>
             </a:fld>
             <a:endParaRPr lang="en-US"/>
           </a:p>
@@ -2029,7 +2029,7 @@
           <a:p>
             <a:fld id="{283E34CF-7AD3-0941-A50D-6D559A1CA0CC}" type="datetimeFigureOut">
               <a:rPr lang="en-US" smtClean="0"/>
-              <a:t>11/29/18</a:t>
+              <a:t>12/3/18</a:t>
             </a:fld>
             <a:endParaRPr lang="en-US"/>
           </a:p>
@@ -2146,7 +2146,7 @@
           <a:p>
             <a:fld id="{283E34CF-7AD3-0941-A50D-6D559A1CA0CC}" type="datetimeFigureOut">
               <a:rPr lang="en-US" smtClean="0"/>
-              <a:t>11/29/18</a:t>
+              <a:t>12/3/18</a:t>
             </a:fld>
             <a:endParaRPr lang="en-US"/>
           </a:p>
@@ -2241,7 +2241,7 @@
           <a:p>
             <a:fld id="{283E34CF-7AD3-0941-A50D-6D559A1CA0CC}" type="datetimeFigureOut">
               <a:rPr lang="en-US" smtClean="0"/>
-              <a:t>11/29/18</a:t>
+              <a:t>12/3/18</a:t>
             </a:fld>
             <a:endParaRPr lang="en-US"/>
           </a:p>
@@ -2516,7 +2516,7 @@
           <a:p>
             <a:fld id="{283E34CF-7AD3-0941-A50D-6D559A1CA0CC}" type="datetimeFigureOut">
               <a:rPr lang="en-US" smtClean="0"/>
-              <a:t>11/29/18</a:t>
+              <a:t>12/3/18</a:t>
             </a:fld>
             <a:endParaRPr lang="en-US"/>
           </a:p>
@@ -2768,7 +2768,7 @@
           <a:p>
             <a:fld id="{283E34CF-7AD3-0941-A50D-6D559A1CA0CC}" type="datetimeFigureOut">
               <a:rPr lang="en-US" smtClean="0"/>
-              <a:t>11/29/18</a:t>
+              <a:t>12/3/18</a:t>
             </a:fld>
             <a:endParaRPr lang="en-US"/>
           </a:p>
@@ -2979,7 +2979,7 @@
           <a:p>
             <a:fld id="{283E34CF-7AD3-0941-A50D-6D559A1CA0CC}" type="datetimeFigureOut">
               <a:rPr lang="en-US" smtClean="0"/>
-              <a:t>11/29/18</a:t>
+              <a:t>12/3/18</a:t>
             </a:fld>
             <a:endParaRPr lang="en-US"/>
           </a:p>
@@ -3482,7 +3482,7 @@
         </p:blipFill>
         <p:spPr>
           <a:xfrm>
-            <a:off x="7418073" y="3540555"/>
+            <a:off x="7364475" y="3662212"/>
             <a:ext cx="3370879" cy="3064435"/>
           </a:xfrm>
           <a:prstGeom prst="rect">
@@ -3519,9 +3519,102 @@
           </a:p>
         </p:txBody>
       </p:sp>
+      <p:sp>
+        <p:nvSpPr>
+          <p:cNvPr id="11" name="TextBox 10"/>
+          <p:cNvSpPr txBox="1"/>
+          <p:nvPr/>
+        </p:nvSpPr>
+        <p:spPr>
+          <a:xfrm>
+            <a:off x="2742" y="0"/>
+            <a:ext cx="402674" cy="523220"/>
+          </a:xfrm>
+          <a:prstGeom prst="rect">
+            <a:avLst/>
+          </a:prstGeom>
+          <a:noFill/>
+        </p:spPr>
+        <p:txBody>
+          <a:bodyPr wrap="none" rtlCol="0">
+            <a:spAutoFit/>
+          </a:bodyPr>
+          <a:lstStyle/>
+          <a:p>
+            <a:r>
+              <a:rPr lang="en-US" sz="2800" b="1" dirty="0"/>
+              <a:t>A</a:t>
+            </a:r>
+          </a:p>
+        </p:txBody>
+      </p:sp>
+      <p:sp>
+        <p:nvSpPr>
+          <p:cNvPr id="13" name="TextBox 12"/>
+          <p:cNvSpPr txBox="1"/>
+          <p:nvPr/>
+        </p:nvSpPr>
+        <p:spPr>
+          <a:xfrm>
+            <a:off x="3410631" y="34683"/>
+            <a:ext cx="386644" cy="523220"/>
+          </a:xfrm>
+          <a:prstGeom prst="rect">
+            <a:avLst/>
+          </a:prstGeom>
+          <a:noFill/>
+        </p:spPr>
+        <p:txBody>
+          <a:bodyPr wrap="none" rtlCol="0">
+            <a:spAutoFit/>
+          </a:bodyPr>
+          <a:lstStyle/>
+          <a:p>
+            <a:r>
+              <a:rPr lang="en-US" sz="2800" b="1" dirty="0"/>
+              <a:t>B</a:t>
+            </a:r>
+          </a:p>
+        </p:txBody>
+      </p:sp>
+      <p:sp>
+        <p:nvSpPr>
+          <p:cNvPr id="16" name="TextBox 15"/>
+          <p:cNvSpPr txBox="1"/>
+          <p:nvPr/>
+        </p:nvSpPr>
+        <p:spPr>
+          <a:xfrm>
+            <a:off x="6821377" y="120166"/>
+            <a:ext cx="375424" cy="523220"/>
+          </a:xfrm>
+          <a:prstGeom prst="rect">
+            <a:avLst/>
+          </a:prstGeom>
+          <a:noFill/>
+        </p:spPr>
+        <p:txBody>
+          <a:bodyPr wrap="none" rtlCol="0">
+            <a:spAutoFit/>
+          </a:bodyPr>
+          <a:lstStyle/>
+          <a:p>
+            <a:r>
+              <a:rPr lang="en-US" sz="2800" b="1" dirty="0"/>
+              <a:t>C</a:t>
+            </a:r>
+          </a:p>
+        </p:txBody>
+      </p:sp>
       <p:pic>
         <p:nvPicPr>
-          <p:cNvPr id="10" name="Picture 9"/>
+          <p:cNvPr id="6" name="Picture 5">
+            <a:extLst>
+              <a:ext uri="{FF2B5EF4-FFF2-40B4-BE49-F238E27FC236}">
+                <a16:creationId xmlns:a16="http://schemas.microsoft.com/office/drawing/2014/main" id="{66C20E9B-A8B8-444B-861A-96D7B9DA8A52}"/>
+              </a:ext>
+            </a:extLst>
+          </p:cNvPr>
           <p:cNvPicPr>
             <a:picLocks noChangeAspect="1"/>
           </p:cNvPicPr>
@@ -3535,46 +3628,23 @@
         </p:blipFill>
         <p:spPr>
           <a:xfrm>
-            <a:off x="702314" y="501947"/>
-            <a:ext cx="2400300" cy="2870200"/>
+            <a:off x="73934" y="3783870"/>
+            <a:ext cx="3370878" cy="2821121"/>
           </a:xfrm>
           <a:prstGeom prst="rect">
             <a:avLst/>
           </a:prstGeom>
         </p:spPr>
       </p:pic>
-      <p:sp>
-        <p:nvSpPr>
-          <p:cNvPr id="11" name="TextBox 10"/>
-          <p:cNvSpPr txBox="1"/>
-          <p:nvPr/>
-        </p:nvSpPr>
-        <p:spPr>
-          <a:xfrm>
-            <a:off x="2742" y="0"/>
-            <a:ext cx="402674" cy="523220"/>
-          </a:xfrm>
-          <a:prstGeom prst="rect">
-            <a:avLst/>
-          </a:prstGeom>
-          <a:noFill/>
-        </p:spPr>
-        <p:txBody>
-          <a:bodyPr wrap="none" rtlCol="0">
-            <a:spAutoFit/>
-          </a:bodyPr>
-          <a:lstStyle/>
-          <a:p>
-            <a:r>
-              <a:rPr lang="en-US" sz="2800" b="1" dirty="0"/>
-              <a:t>A</a:t>
-            </a:r>
-          </a:p>
-        </p:txBody>
-      </p:sp>
       <p:pic>
         <p:nvPicPr>
-          <p:cNvPr id="12" name="Picture 11"/>
+          <p:cNvPr id="14" name="Picture 13">
+            <a:extLst>
+              <a:ext uri="{FF2B5EF4-FFF2-40B4-BE49-F238E27FC236}">
+                <a16:creationId xmlns:a16="http://schemas.microsoft.com/office/drawing/2014/main" id="{6CA7E557-5FC5-2249-88D3-61D6593D073C}"/>
+              </a:ext>
+            </a:extLst>
+          </p:cNvPr>
           <p:cNvPicPr>
             <a:picLocks noChangeAspect="1"/>
           </p:cNvPicPr>
@@ -3588,46 +3658,23 @@
         </p:blipFill>
         <p:spPr>
           <a:xfrm>
-            <a:off x="3944819" y="639193"/>
-            <a:ext cx="2794000" cy="2857500"/>
+            <a:off x="7155458" y="729469"/>
+            <a:ext cx="3788911" cy="2556595"/>
           </a:xfrm>
           <a:prstGeom prst="rect">
             <a:avLst/>
           </a:prstGeom>
         </p:spPr>
       </p:pic>
-      <p:sp>
-        <p:nvSpPr>
-          <p:cNvPr id="13" name="TextBox 12"/>
-          <p:cNvSpPr txBox="1"/>
-          <p:nvPr/>
-        </p:nvSpPr>
-        <p:spPr>
-          <a:xfrm>
-            <a:off x="3410631" y="34683"/>
-            <a:ext cx="386644" cy="523220"/>
-          </a:xfrm>
-          <a:prstGeom prst="rect">
-            <a:avLst/>
-          </a:prstGeom>
-          <a:noFill/>
-        </p:spPr>
-        <p:txBody>
-          <a:bodyPr wrap="none" rtlCol="0">
-            <a:spAutoFit/>
-          </a:bodyPr>
-          <a:lstStyle/>
-          <a:p>
-            <a:r>
-              <a:rPr lang="en-US" sz="2800" b="1" dirty="0"/>
-              <a:t>B</a:t>
-            </a:r>
-          </a:p>
-        </p:txBody>
-      </p:sp>
       <p:pic>
         <p:nvPicPr>
-          <p:cNvPr id="15" name="Picture 14"/>
+          <p:cNvPr id="10" name="Picture 9">
+            <a:extLst>
+              <a:ext uri="{FF2B5EF4-FFF2-40B4-BE49-F238E27FC236}">
+                <a16:creationId xmlns:a16="http://schemas.microsoft.com/office/drawing/2014/main" id="{EEEA2B5A-D2B0-E64A-9ACA-97D595698605}"/>
+              </a:ext>
+            </a:extLst>
+          </p:cNvPr>
           <p:cNvPicPr>
             <a:picLocks noChangeAspect="1"/>
           </p:cNvPicPr>
@@ -3641,49 +3688,20 @@
         </p:blipFill>
         <p:spPr>
           <a:xfrm>
-            <a:off x="7418073" y="550358"/>
-            <a:ext cx="3732853" cy="2597150"/>
+            <a:off x="425873" y="406400"/>
+            <a:ext cx="2667000" cy="3022600"/>
           </a:xfrm>
           <a:prstGeom prst="rect">
             <a:avLst/>
           </a:prstGeom>
         </p:spPr>
       </p:pic>
-      <p:sp>
-        <p:nvSpPr>
-          <p:cNvPr id="16" name="TextBox 15"/>
-          <p:cNvSpPr txBox="1"/>
-          <p:nvPr/>
-        </p:nvSpPr>
-        <p:spPr>
-          <a:xfrm>
-            <a:off x="6821377" y="120166"/>
-            <a:ext cx="375424" cy="523220"/>
-          </a:xfrm>
-          <a:prstGeom prst="rect">
-            <a:avLst/>
-          </a:prstGeom>
-          <a:noFill/>
-        </p:spPr>
-        <p:txBody>
-          <a:bodyPr wrap="none" rtlCol="0">
-            <a:spAutoFit/>
-          </a:bodyPr>
-          <a:lstStyle/>
-          <a:p>
-            <a:r>
-              <a:rPr lang="en-US" sz="2800" b="1" dirty="0"/>
-              <a:t>C</a:t>
-            </a:r>
-          </a:p>
-        </p:txBody>
-      </p:sp>
       <p:pic>
         <p:nvPicPr>
-          <p:cNvPr id="6" name="Picture 5">
+          <p:cNvPr id="15" name="Picture 14">
             <a:extLst>
               <a:ext uri="{FF2B5EF4-FFF2-40B4-BE49-F238E27FC236}">
-                <a16:creationId xmlns:a16="http://schemas.microsoft.com/office/drawing/2014/main" id="{66C20E9B-A8B8-444B-861A-96D7B9DA8A52}"/>
+                <a16:creationId xmlns:a16="http://schemas.microsoft.com/office/drawing/2014/main" id="{CAA5D1EC-81DE-B44B-B0C2-789544CEE9E1}"/>
               </a:ext>
             </a:extLst>
           </p:cNvPr>
@@ -3700,8 +3718,8 @@
         </p:blipFill>
         <p:spPr>
           <a:xfrm>
-            <a:off x="73934" y="3783870"/>
-            <a:ext cx="3370878" cy="2821121"/>
+            <a:off x="3602994" y="509166"/>
+            <a:ext cx="2933700" cy="2997200"/>
           </a:xfrm>
           <a:prstGeom prst="rect">
             <a:avLst/>

</xml_diff>

<commit_message>
added directory for caitlin's scripts
</commit_message>
<xml_diff>
--- a/Fungi/Fig1.pptx
+++ b/Fungi/Fig1.pptx
@@ -197,7 +197,7 @@
           <a:p>
             <a:fld id="{E1E67E7B-035A-4F4E-A435-C359FA3B27EE}" type="datetimeFigureOut">
               <a:rPr lang="en-US" smtClean="0"/>
-              <a:t>12/3/18</a:t>
+              <a:t>12/4/18</a:t>
             </a:fld>
             <a:endParaRPr lang="en-US"/>
           </a:p>
@@ -677,7 +677,7 @@
           <a:p>
             <a:fld id="{283E34CF-7AD3-0941-A50D-6D559A1CA0CC}" type="datetimeFigureOut">
               <a:rPr lang="en-US" smtClean="0"/>
-              <a:t>12/3/18</a:t>
+              <a:t>12/4/18</a:t>
             </a:fld>
             <a:endParaRPr lang="en-US"/>
           </a:p>
@@ -845,7 +845,7 @@
           <a:p>
             <a:fld id="{283E34CF-7AD3-0941-A50D-6D559A1CA0CC}" type="datetimeFigureOut">
               <a:rPr lang="en-US" smtClean="0"/>
-              <a:t>12/3/18</a:t>
+              <a:t>12/4/18</a:t>
             </a:fld>
             <a:endParaRPr lang="en-US"/>
           </a:p>
@@ -1023,7 +1023,7 @@
           <a:p>
             <a:fld id="{283E34CF-7AD3-0941-A50D-6D559A1CA0CC}" type="datetimeFigureOut">
               <a:rPr lang="en-US" smtClean="0"/>
-              <a:t>12/3/18</a:t>
+              <a:t>12/4/18</a:t>
             </a:fld>
             <a:endParaRPr lang="en-US"/>
           </a:p>
@@ -1191,7 +1191,7 @@
           <a:p>
             <a:fld id="{283E34CF-7AD3-0941-A50D-6D559A1CA0CC}" type="datetimeFigureOut">
               <a:rPr lang="en-US" smtClean="0"/>
-              <a:t>12/3/18</a:t>
+              <a:t>12/4/18</a:t>
             </a:fld>
             <a:endParaRPr lang="en-US"/>
           </a:p>
@@ -1436,7 +1436,7 @@
           <a:p>
             <a:fld id="{283E34CF-7AD3-0941-A50D-6D559A1CA0CC}" type="datetimeFigureOut">
               <a:rPr lang="en-US" smtClean="0"/>
-              <a:t>12/3/18</a:t>
+              <a:t>12/4/18</a:t>
             </a:fld>
             <a:endParaRPr lang="en-US"/>
           </a:p>
@@ -1665,7 +1665,7 @@
           <a:p>
             <a:fld id="{283E34CF-7AD3-0941-A50D-6D559A1CA0CC}" type="datetimeFigureOut">
               <a:rPr lang="en-US" smtClean="0"/>
-              <a:t>12/3/18</a:t>
+              <a:t>12/4/18</a:t>
             </a:fld>
             <a:endParaRPr lang="en-US"/>
           </a:p>
@@ -2029,7 +2029,7 @@
           <a:p>
             <a:fld id="{283E34CF-7AD3-0941-A50D-6D559A1CA0CC}" type="datetimeFigureOut">
               <a:rPr lang="en-US" smtClean="0"/>
-              <a:t>12/3/18</a:t>
+              <a:t>12/4/18</a:t>
             </a:fld>
             <a:endParaRPr lang="en-US"/>
           </a:p>
@@ -2146,7 +2146,7 @@
           <a:p>
             <a:fld id="{283E34CF-7AD3-0941-A50D-6D559A1CA0CC}" type="datetimeFigureOut">
               <a:rPr lang="en-US" smtClean="0"/>
-              <a:t>12/3/18</a:t>
+              <a:t>12/4/18</a:t>
             </a:fld>
             <a:endParaRPr lang="en-US"/>
           </a:p>
@@ -2241,7 +2241,7 @@
           <a:p>
             <a:fld id="{283E34CF-7AD3-0941-A50D-6D559A1CA0CC}" type="datetimeFigureOut">
               <a:rPr lang="en-US" smtClean="0"/>
-              <a:t>12/3/18</a:t>
+              <a:t>12/4/18</a:t>
             </a:fld>
             <a:endParaRPr lang="en-US"/>
           </a:p>
@@ -2516,7 +2516,7 @@
           <a:p>
             <a:fld id="{283E34CF-7AD3-0941-A50D-6D559A1CA0CC}" type="datetimeFigureOut">
               <a:rPr lang="en-US" smtClean="0"/>
-              <a:t>12/3/18</a:t>
+              <a:t>12/4/18</a:t>
             </a:fld>
             <a:endParaRPr lang="en-US"/>
           </a:p>
@@ -2768,7 +2768,7 @@
           <a:p>
             <a:fld id="{283E34CF-7AD3-0941-A50D-6D559A1CA0CC}" type="datetimeFigureOut">
               <a:rPr lang="en-US" smtClean="0"/>
-              <a:t>12/3/18</a:t>
+              <a:t>12/4/18</a:t>
             </a:fld>
             <a:endParaRPr lang="en-US"/>
           </a:p>
@@ -2979,7 +2979,7 @@
           <a:p>
             <a:fld id="{283E34CF-7AD3-0941-A50D-6D559A1CA0CC}" type="datetimeFigureOut">
               <a:rPr lang="en-US" smtClean="0"/>
-              <a:t>12/3/18</a:t>
+              <a:t>12/4/18</a:t>
             </a:fld>
             <a:endParaRPr lang="en-US"/>
           </a:p>
@@ -3668,10 +3668,10 @@
       </p:pic>
       <p:pic>
         <p:nvPicPr>
-          <p:cNvPr id="10" name="Picture 9">
+          <p:cNvPr id="4" name="Picture 3">
             <a:extLst>
               <a:ext uri="{FF2B5EF4-FFF2-40B4-BE49-F238E27FC236}">
-                <a16:creationId xmlns:a16="http://schemas.microsoft.com/office/drawing/2014/main" id="{EEEA2B5A-D2B0-E64A-9ACA-97D595698605}"/>
+                <a16:creationId xmlns:a16="http://schemas.microsoft.com/office/drawing/2014/main" id="{093AFC29-9B00-2C43-9897-986974E8EC87}"/>
               </a:ext>
             </a:extLst>
           </p:cNvPr>
@@ -3688,8 +3688,8 @@
         </p:blipFill>
         <p:spPr>
           <a:xfrm>
-            <a:off x="425873" y="406400"/>
-            <a:ext cx="2667000" cy="3022600"/>
+            <a:off x="333072" y="560317"/>
+            <a:ext cx="2705100" cy="3022600"/>
           </a:xfrm>
           <a:prstGeom prst="rect">
             <a:avLst/>
@@ -3698,10 +3698,10 @@
       </p:pic>
       <p:pic>
         <p:nvPicPr>
-          <p:cNvPr id="15" name="Picture 14">
+          <p:cNvPr id="17" name="Picture 16">
             <a:extLst>
               <a:ext uri="{FF2B5EF4-FFF2-40B4-BE49-F238E27FC236}">
-                <a16:creationId xmlns:a16="http://schemas.microsoft.com/office/drawing/2014/main" id="{CAA5D1EC-81DE-B44B-B0C2-789544CEE9E1}"/>
+                <a16:creationId xmlns:a16="http://schemas.microsoft.com/office/drawing/2014/main" id="{F96A818E-367C-5D42-84FA-7E6F3C5C047F}"/>
               </a:ext>
             </a:extLst>
           </p:cNvPr>
@@ -3718,8 +3718,8 @@
         </p:blipFill>
         <p:spPr>
           <a:xfrm>
-            <a:off x="3602994" y="509166"/>
-            <a:ext cx="2933700" cy="2997200"/>
+            <a:off x="3501753" y="603275"/>
+            <a:ext cx="3238500" cy="2997200"/>
           </a:xfrm>
           <a:prstGeom prst="rect">
             <a:avLst/>

</xml_diff>

<commit_message>
updated proper mean for combined chrom and contig lengths
</commit_message>
<xml_diff>
--- a/Fungi/Fig1.pptx
+++ b/Fungi/Fig1.pptx
@@ -3688,8 +3688,8 @@
         </p:blipFill>
         <p:spPr>
           <a:xfrm>
-            <a:off x="333072" y="560317"/>
-            <a:ext cx="2705100" cy="3022600"/>
+            <a:off x="703528" y="879636"/>
+            <a:ext cx="1766661" cy="1974016"/>
           </a:xfrm>
           <a:prstGeom prst="rect">
             <a:avLst/>

</xml_diff>

<commit_message>
updated mt proportion in jgi1k
</commit_message>
<xml_diff>
--- a/Fungi/Fig1.pptx
+++ b/Fungi/Fig1.pptx
@@ -197,7 +197,7 @@
           <a:p>
             <a:fld id="{E1E67E7B-035A-4F4E-A435-C359FA3B27EE}" type="datetimeFigureOut">
               <a:rPr lang="en-US" smtClean="0"/>
-              <a:t>2/11/19</a:t>
+              <a:t>2/12/19</a:t>
             </a:fld>
             <a:endParaRPr lang="en-US"/>
           </a:p>
@@ -677,7 +677,7 @@
           <a:p>
             <a:fld id="{283E34CF-7AD3-0941-A50D-6D559A1CA0CC}" type="datetimeFigureOut">
               <a:rPr lang="en-US" smtClean="0"/>
-              <a:t>2/11/19</a:t>
+              <a:t>2/12/19</a:t>
             </a:fld>
             <a:endParaRPr lang="en-US"/>
           </a:p>
@@ -845,7 +845,7 @@
           <a:p>
             <a:fld id="{283E34CF-7AD3-0941-A50D-6D559A1CA0CC}" type="datetimeFigureOut">
               <a:rPr lang="en-US" smtClean="0"/>
-              <a:t>2/11/19</a:t>
+              <a:t>2/12/19</a:t>
             </a:fld>
             <a:endParaRPr lang="en-US"/>
           </a:p>
@@ -1023,7 +1023,7 @@
           <a:p>
             <a:fld id="{283E34CF-7AD3-0941-A50D-6D559A1CA0CC}" type="datetimeFigureOut">
               <a:rPr lang="en-US" smtClean="0"/>
-              <a:t>2/11/19</a:t>
+              <a:t>2/12/19</a:t>
             </a:fld>
             <a:endParaRPr lang="en-US"/>
           </a:p>
@@ -1191,7 +1191,7 @@
           <a:p>
             <a:fld id="{283E34CF-7AD3-0941-A50D-6D559A1CA0CC}" type="datetimeFigureOut">
               <a:rPr lang="en-US" smtClean="0"/>
-              <a:t>2/11/19</a:t>
+              <a:t>2/12/19</a:t>
             </a:fld>
             <a:endParaRPr lang="en-US"/>
           </a:p>
@@ -1436,7 +1436,7 @@
           <a:p>
             <a:fld id="{283E34CF-7AD3-0941-A50D-6D559A1CA0CC}" type="datetimeFigureOut">
               <a:rPr lang="en-US" smtClean="0"/>
-              <a:t>2/11/19</a:t>
+              <a:t>2/12/19</a:t>
             </a:fld>
             <a:endParaRPr lang="en-US"/>
           </a:p>
@@ -1665,7 +1665,7 @@
           <a:p>
             <a:fld id="{283E34CF-7AD3-0941-A50D-6D559A1CA0CC}" type="datetimeFigureOut">
               <a:rPr lang="en-US" smtClean="0"/>
-              <a:t>2/11/19</a:t>
+              <a:t>2/12/19</a:t>
             </a:fld>
             <a:endParaRPr lang="en-US"/>
           </a:p>
@@ -2029,7 +2029,7 @@
           <a:p>
             <a:fld id="{283E34CF-7AD3-0941-A50D-6D559A1CA0CC}" type="datetimeFigureOut">
               <a:rPr lang="en-US" smtClean="0"/>
-              <a:t>2/11/19</a:t>
+              <a:t>2/12/19</a:t>
             </a:fld>
             <a:endParaRPr lang="en-US"/>
           </a:p>
@@ -2146,7 +2146,7 @@
           <a:p>
             <a:fld id="{283E34CF-7AD3-0941-A50D-6D559A1CA0CC}" type="datetimeFigureOut">
               <a:rPr lang="en-US" smtClean="0"/>
-              <a:t>2/11/19</a:t>
+              <a:t>2/12/19</a:t>
             </a:fld>
             <a:endParaRPr lang="en-US"/>
           </a:p>
@@ -2241,7 +2241,7 @@
           <a:p>
             <a:fld id="{283E34CF-7AD3-0941-A50D-6D559A1CA0CC}" type="datetimeFigureOut">
               <a:rPr lang="en-US" smtClean="0"/>
-              <a:t>2/11/19</a:t>
+              <a:t>2/12/19</a:t>
             </a:fld>
             <a:endParaRPr lang="en-US"/>
           </a:p>
@@ -2516,7 +2516,7 @@
           <a:p>
             <a:fld id="{283E34CF-7AD3-0941-A50D-6D559A1CA0CC}" type="datetimeFigureOut">
               <a:rPr lang="en-US" smtClean="0"/>
-              <a:t>2/11/19</a:t>
+              <a:t>2/12/19</a:t>
             </a:fld>
             <a:endParaRPr lang="en-US"/>
           </a:p>
@@ -2768,7 +2768,7 @@
           <a:p>
             <a:fld id="{283E34CF-7AD3-0941-A50D-6D559A1CA0CC}" type="datetimeFigureOut">
               <a:rPr lang="en-US" smtClean="0"/>
-              <a:t>2/11/19</a:t>
+              <a:t>2/12/19</a:t>
             </a:fld>
             <a:endParaRPr lang="en-US"/>
           </a:p>
@@ -2979,7 +2979,7 @@
           <a:p>
             <a:fld id="{283E34CF-7AD3-0941-A50D-6D559A1CA0CC}" type="datetimeFigureOut">
               <a:rPr lang="en-US" smtClean="0"/>
-              <a:t>2/11/19</a:t>
+              <a:t>2/12/19</a:t>
             </a:fld>
             <a:endParaRPr lang="en-US"/>
           </a:p>
@@ -3386,64 +3386,6 @@
       </p:grpSpPr>
       <p:sp>
         <p:nvSpPr>
-          <p:cNvPr id="5" name="TextBox 4"/>
-          <p:cNvSpPr txBox="1"/>
-          <p:nvPr/>
-        </p:nvSpPr>
-        <p:spPr>
-          <a:xfrm>
-            <a:off x="0" y="3293653"/>
-            <a:ext cx="410690" cy="523220"/>
-          </a:xfrm>
-          <a:prstGeom prst="rect">
-            <a:avLst/>
-          </a:prstGeom>
-          <a:noFill/>
-        </p:spPr>
-        <p:txBody>
-          <a:bodyPr wrap="none" rtlCol="0">
-            <a:spAutoFit/>
-          </a:bodyPr>
-          <a:lstStyle/>
-          <a:p>
-            <a:r>
-              <a:rPr lang="en-US" sz="2800" b="1" dirty="0"/>
-              <a:t>D</a:t>
-            </a:r>
-          </a:p>
-        </p:txBody>
-      </p:sp>
-      <p:sp>
-        <p:nvSpPr>
-          <p:cNvPr id="7" name="TextBox 6"/>
-          <p:cNvSpPr txBox="1"/>
-          <p:nvPr/>
-        </p:nvSpPr>
-        <p:spPr>
-          <a:xfrm>
-            <a:off x="3731210" y="3429000"/>
-            <a:ext cx="359394" cy="523220"/>
-          </a:xfrm>
-          <a:prstGeom prst="rect">
-            <a:avLst/>
-          </a:prstGeom>
-          <a:noFill/>
-        </p:spPr>
-        <p:txBody>
-          <a:bodyPr wrap="none" rtlCol="0">
-            <a:spAutoFit/>
-          </a:bodyPr>
-          <a:lstStyle/>
-          <a:p>
-            <a:r>
-              <a:rPr lang="en-US" sz="2800" b="1" dirty="0"/>
-              <a:t>E</a:t>
-            </a:r>
-          </a:p>
-        </p:txBody>
-      </p:sp>
-      <p:sp>
-        <p:nvSpPr>
           <p:cNvPr id="9" name="TextBox 8"/>
           <p:cNvSpPr txBox="1"/>
           <p:nvPr/>
@@ -3473,42 +3415,13 @@
       </p:sp>
       <p:sp>
         <p:nvSpPr>
-          <p:cNvPr id="11" name="TextBox 10"/>
-          <p:cNvSpPr txBox="1"/>
-          <p:nvPr/>
-        </p:nvSpPr>
-        <p:spPr>
-          <a:xfrm>
-            <a:off x="2742" y="0"/>
-            <a:ext cx="402674" cy="523220"/>
-          </a:xfrm>
-          <a:prstGeom prst="rect">
-            <a:avLst/>
-          </a:prstGeom>
-          <a:noFill/>
-        </p:spPr>
-        <p:txBody>
-          <a:bodyPr wrap="none" rtlCol="0">
-            <a:spAutoFit/>
-          </a:bodyPr>
-          <a:lstStyle/>
-          <a:p>
-            <a:r>
-              <a:rPr lang="en-US" sz="2800" b="1" dirty="0"/>
-              <a:t>A</a:t>
-            </a:r>
-          </a:p>
-        </p:txBody>
-      </p:sp>
-      <p:sp>
-        <p:nvSpPr>
           <p:cNvPr id="13" name="TextBox 12"/>
           <p:cNvSpPr txBox="1"/>
           <p:nvPr/>
         </p:nvSpPr>
         <p:spPr>
           <a:xfrm>
-            <a:off x="3646765" y="39585"/>
+            <a:off x="3807524" y="230814"/>
             <a:ext cx="386644" cy="523220"/>
           </a:xfrm>
           <a:prstGeom prst="rect">
@@ -3560,10 +3473,10 @@
       </p:sp>
       <p:pic>
         <p:nvPicPr>
-          <p:cNvPr id="10" name="Picture 9">
+          <p:cNvPr id="6" name="Picture 5">
             <a:extLst>
               <a:ext uri="{FF2B5EF4-FFF2-40B4-BE49-F238E27FC236}">
-                <a16:creationId xmlns:a16="http://schemas.microsoft.com/office/drawing/2014/main" id="{DDF8588E-E408-0048-98DF-80CC8F794A42}"/>
+                <a16:creationId xmlns:a16="http://schemas.microsoft.com/office/drawing/2014/main" id="{3AC0D583-EE20-7346-B6D3-3EC1CCB4569D}"/>
               </a:ext>
             </a:extLst>
           </p:cNvPr>
@@ -3580,8 +3493,8 @@
         </p:blipFill>
         <p:spPr>
           <a:xfrm>
-            <a:off x="383523" y="523219"/>
-            <a:ext cx="3051145" cy="3051145"/>
+            <a:off x="4090605" y="301195"/>
+            <a:ext cx="3420556" cy="3420556"/>
           </a:xfrm>
           <a:prstGeom prst="rect">
             <a:avLst/>
@@ -3590,10 +3503,10 @@
       </p:pic>
       <p:pic>
         <p:nvPicPr>
-          <p:cNvPr id="15" name="Picture 14">
+          <p:cNvPr id="12" name="Picture 11">
             <a:extLst>
               <a:ext uri="{FF2B5EF4-FFF2-40B4-BE49-F238E27FC236}">
-                <a16:creationId xmlns:a16="http://schemas.microsoft.com/office/drawing/2014/main" id="{04EDF9D1-A4BD-EE41-81FC-BE92F97518C9}"/>
+                <a16:creationId xmlns:a16="http://schemas.microsoft.com/office/drawing/2014/main" id="{1768FC5F-476A-7345-842F-6028B654BAC0}"/>
               </a:ext>
             </a:extLst>
           </p:cNvPr>
@@ -3610,8 +3523,8 @@
         </p:blipFill>
         <p:spPr>
           <a:xfrm>
-            <a:off x="4387147" y="523219"/>
-            <a:ext cx="3051145" cy="3051145"/>
+            <a:off x="7821475" y="529591"/>
+            <a:ext cx="4213638" cy="2843183"/>
           </a:xfrm>
           <a:prstGeom prst="rect">
             <a:avLst/>
@@ -3620,10 +3533,10 @@
       </p:pic>
       <p:pic>
         <p:nvPicPr>
-          <p:cNvPr id="19" name="Picture 18">
+          <p:cNvPr id="17" name="Picture 16">
             <a:extLst>
               <a:ext uri="{FF2B5EF4-FFF2-40B4-BE49-F238E27FC236}">
-                <a16:creationId xmlns:a16="http://schemas.microsoft.com/office/drawing/2014/main" id="{87FAFBF3-574B-504A-BA4A-8758898A71E4}"/>
+                <a16:creationId xmlns:a16="http://schemas.microsoft.com/office/drawing/2014/main" id="{77675BCC-39FF-1245-B120-6E6A45A82619}"/>
               </a:ext>
             </a:extLst>
           </p:cNvPr>
@@ -3640,8 +3553,8 @@
         </p:blipFill>
         <p:spPr>
           <a:xfrm>
-            <a:off x="149586" y="3744623"/>
-            <a:ext cx="3685931" cy="3084792"/>
+            <a:off x="4176158" y="3592398"/>
+            <a:ext cx="3628696" cy="3263152"/>
           </a:xfrm>
           <a:prstGeom prst="rect">
             <a:avLst/>
@@ -3650,10 +3563,10 @@
       </p:pic>
       <p:pic>
         <p:nvPicPr>
-          <p:cNvPr id="21" name="Picture 20">
+          <p:cNvPr id="20" name="Picture 19">
             <a:extLst>
               <a:ext uri="{FF2B5EF4-FFF2-40B4-BE49-F238E27FC236}">
-                <a16:creationId xmlns:a16="http://schemas.microsoft.com/office/drawing/2014/main" id="{FD9A0D0D-F7FA-9A44-87FF-F504A235A4A0}"/>
+                <a16:creationId xmlns:a16="http://schemas.microsoft.com/office/drawing/2014/main" id="{BB900F9E-24FE-F143-AE19-CBB39C3C0514}"/>
               </a:ext>
             </a:extLst>
           </p:cNvPr>
@@ -3670,8 +3583,8 @@
         </p:blipFill>
         <p:spPr>
           <a:xfrm>
-            <a:off x="3985102" y="3729849"/>
-            <a:ext cx="3453189" cy="3105325"/>
+            <a:off x="8323319" y="3690610"/>
+            <a:ext cx="3544431" cy="3187376"/>
           </a:xfrm>
           <a:prstGeom prst="rect">
             <a:avLst/>
@@ -3680,10 +3593,10 @@
       </p:pic>
       <p:pic>
         <p:nvPicPr>
-          <p:cNvPr id="23" name="Picture 22">
+          <p:cNvPr id="27" name="Picture 26">
             <a:extLst>
               <a:ext uri="{FF2B5EF4-FFF2-40B4-BE49-F238E27FC236}">
-                <a16:creationId xmlns:a16="http://schemas.microsoft.com/office/drawing/2014/main" id="{0A6C26FB-60E9-554D-AEA1-049D3571A3B9}"/>
+                <a16:creationId xmlns:a16="http://schemas.microsoft.com/office/drawing/2014/main" id="{8855ACD9-CE60-D44E-AD21-9333DE2561FB}"/>
               </a:ext>
             </a:extLst>
           </p:cNvPr>
@@ -3700,20 +3613,119 @@
         </p:blipFill>
         <p:spPr>
           <a:xfrm>
-            <a:off x="7804854" y="641543"/>
-            <a:ext cx="4171123" cy="2814496"/>
+            <a:off x="276018" y="301195"/>
+            <a:ext cx="3511873" cy="3511873"/>
           </a:xfrm>
           <a:prstGeom prst="rect">
             <a:avLst/>
           </a:prstGeom>
         </p:spPr>
       </p:pic>
+      <p:sp>
+        <p:nvSpPr>
+          <p:cNvPr id="11" name="TextBox 10"/>
+          <p:cNvSpPr txBox="1"/>
+          <p:nvPr/>
+        </p:nvSpPr>
+        <p:spPr>
+          <a:xfrm>
+            <a:off x="55048" y="192887"/>
+            <a:ext cx="402674" cy="523220"/>
+          </a:xfrm>
+          <a:prstGeom prst="rect">
+            <a:avLst/>
+          </a:prstGeom>
+          <a:noFill/>
+        </p:spPr>
+        <p:txBody>
+          <a:bodyPr wrap="square" rtlCol="0">
+            <a:spAutoFit/>
+          </a:bodyPr>
+          <a:lstStyle/>
+          <a:p>
+            <a:r>
+              <a:rPr lang="en-US" sz="2800" b="1" dirty="0"/>
+              <a:t>A</a:t>
+            </a:r>
+          </a:p>
+        </p:txBody>
+      </p:sp>
+      <p:sp>
+        <p:nvSpPr>
+          <p:cNvPr id="28" name="TextBox 27">
+            <a:extLst>
+              <a:ext uri="{FF2B5EF4-FFF2-40B4-BE49-F238E27FC236}">
+                <a16:creationId xmlns:a16="http://schemas.microsoft.com/office/drawing/2014/main" id="{7BF06C5A-7A22-C04C-BEAE-E517816FBBE5}"/>
+              </a:ext>
+            </a:extLst>
+          </p:cNvPr>
+          <p:cNvSpPr txBox="1"/>
+          <p:nvPr/>
+        </p:nvSpPr>
+        <p:spPr>
+          <a:xfrm>
+            <a:off x="1642264" y="62375"/>
+            <a:ext cx="779381" cy="369332"/>
+          </a:xfrm>
+          <a:prstGeom prst="rect">
+            <a:avLst/>
+          </a:prstGeom>
+          <a:noFill/>
+        </p:spPr>
+        <p:txBody>
+          <a:bodyPr wrap="none" rtlCol="0">
+            <a:spAutoFit/>
+          </a:bodyPr>
+          <a:lstStyle/>
+          <a:p>
+            <a:r>
+              <a:rPr lang="en-US" dirty="0"/>
+              <a:t>Genus</a:t>
+            </a:r>
+          </a:p>
+        </p:txBody>
+      </p:sp>
+      <p:sp>
+        <p:nvSpPr>
+          <p:cNvPr id="29" name="TextBox 28">
+            <a:extLst>
+              <a:ext uri="{FF2B5EF4-FFF2-40B4-BE49-F238E27FC236}">
+                <a16:creationId xmlns:a16="http://schemas.microsoft.com/office/drawing/2014/main" id="{2DA85F8E-8C33-584A-A2EC-2B6488EBF2CC}"/>
+              </a:ext>
+            </a:extLst>
+          </p:cNvPr>
+          <p:cNvSpPr txBox="1"/>
+          <p:nvPr/>
+        </p:nvSpPr>
+        <p:spPr>
+          <a:xfrm>
+            <a:off x="5359096" y="81339"/>
+            <a:ext cx="883575" cy="369332"/>
+          </a:xfrm>
+          <a:prstGeom prst="rect">
+            <a:avLst/>
+          </a:prstGeom>
+          <a:noFill/>
+        </p:spPr>
+        <p:txBody>
+          <a:bodyPr wrap="none" rtlCol="0">
+            <a:spAutoFit/>
+          </a:bodyPr>
+          <a:lstStyle/>
+          <a:p>
+            <a:r>
+              <a:rPr lang="en-US" dirty="0"/>
+              <a:t>Species</a:t>
+            </a:r>
+          </a:p>
+        </p:txBody>
+      </p:sp>
       <p:pic>
         <p:nvPicPr>
-          <p:cNvPr id="25" name="Picture 24">
+          <p:cNvPr id="24" name="Picture 23">
             <a:extLst>
               <a:ext uri="{FF2B5EF4-FFF2-40B4-BE49-F238E27FC236}">
-                <a16:creationId xmlns:a16="http://schemas.microsoft.com/office/drawing/2014/main" id="{FBE63BBB-B4AD-0840-A37B-EAAC9593D930}"/>
+                <a16:creationId xmlns:a16="http://schemas.microsoft.com/office/drawing/2014/main" id="{A1BC8856-7A9D-3342-8B71-9591AECBC3A7}"/>
               </a:ext>
             </a:extLst>
           </p:cNvPr>
@@ -3730,14 +3742,72 @@
         </p:blipFill>
         <p:spPr>
           <a:xfrm>
-            <a:off x="8163820" y="3729848"/>
-            <a:ext cx="3453189" cy="3105325"/>
+            <a:off x="220591" y="3690610"/>
+            <a:ext cx="3808505" cy="3187376"/>
           </a:xfrm>
           <a:prstGeom prst="rect">
             <a:avLst/>
           </a:prstGeom>
         </p:spPr>
       </p:pic>
+      <p:sp>
+        <p:nvSpPr>
+          <p:cNvPr id="5" name="TextBox 4"/>
+          <p:cNvSpPr txBox="1"/>
+          <p:nvPr/>
+        </p:nvSpPr>
+        <p:spPr>
+          <a:xfrm>
+            <a:off x="0" y="3293653"/>
+            <a:ext cx="410690" cy="523220"/>
+          </a:xfrm>
+          <a:prstGeom prst="rect">
+            <a:avLst/>
+          </a:prstGeom>
+          <a:noFill/>
+        </p:spPr>
+        <p:txBody>
+          <a:bodyPr wrap="none" rtlCol="0">
+            <a:spAutoFit/>
+          </a:bodyPr>
+          <a:lstStyle/>
+          <a:p>
+            <a:r>
+              <a:rPr lang="en-US" sz="2800" b="1" dirty="0"/>
+              <a:t>D</a:t>
+            </a:r>
+          </a:p>
+        </p:txBody>
+      </p:sp>
+      <p:sp>
+        <p:nvSpPr>
+          <p:cNvPr id="7" name="TextBox 6"/>
+          <p:cNvSpPr txBox="1"/>
+          <p:nvPr/>
+        </p:nvSpPr>
+        <p:spPr>
+          <a:xfrm>
+            <a:off x="3849399" y="3429000"/>
+            <a:ext cx="359394" cy="523220"/>
+          </a:xfrm>
+          <a:prstGeom prst="rect">
+            <a:avLst/>
+          </a:prstGeom>
+          <a:noFill/>
+        </p:spPr>
+        <p:txBody>
+          <a:bodyPr wrap="none" rtlCol="0">
+            <a:spAutoFit/>
+          </a:bodyPr>
+          <a:lstStyle/>
+          <a:p>
+            <a:r>
+              <a:rPr lang="en-US" sz="2800" b="1" dirty="0"/>
+              <a:t>E</a:t>
+            </a:r>
+          </a:p>
+        </p:txBody>
+      </p:sp>
     </p:spTree>
     <p:extLst>
       <p:ext uri="{BB962C8B-B14F-4D97-AF65-F5344CB8AC3E}">

</xml_diff>